<commit_message>
Revisão de formatação da apresentação e geração de novo PDF
</commit_message>
<xml_diff>
--- a/IHM Stefanini - Análise de Oportunidade - Flotação.pptx
+++ b/IHM Stefanini - Análise de Oportunidade - Flotação.pptx
@@ -242,7 +242,7 @@
           <a:p>
             <a:fld id="{CE0ED315-2846-4B4B-A190-EEBD2C7F90E5}" type="datetimeFigureOut">
               <a:rPr lang="pt-BR" smtClean="0"/>
-              <a:t>29/05/2025</a:t>
+              <a:t>30/05/2025</a:t>
             </a:fld>
             <a:endParaRPr lang="pt-BR"/>
           </a:p>
@@ -740,7 +740,7 @@
           <a:p>
             <a:fld id="{C650971E-85D7-4925-A186-D4F946D63362}" type="datetimeFigureOut">
               <a:rPr lang="pt-BR" smtClean="0"/>
-              <a:t>29/05/2025</a:t>
+              <a:t>30/05/2025</a:t>
             </a:fld>
             <a:endParaRPr lang="pt-BR"/>
           </a:p>
@@ -938,7 +938,7 @@
           <a:p>
             <a:fld id="{C650971E-85D7-4925-A186-D4F946D63362}" type="datetimeFigureOut">
               <a:rPr lang="pt-BR" smtClean="0"/>
-              <a:t>29/05/2025</a:t>
+              <a:t>30/05/2025</a:t>
             </a:fld>
             <a:endParaRPr lang="pt-BR"/>
           </a:p>
@@ -1146,7 +1146,7 @@
           <a:p>
             <a:fld id="{C650971E-85D7-4925-A186-D4F946D63362}" type="datetimeFigureOut">
               <a:rPr lang="pt-BR" smtClean="0"/>
-              <a:t>29/05/2025</a:t>
+              <a:t>30/05/2025</a:t>
             </a:fld>
             <a:endParaRPr lang="pt-BR"/>
           </a:p>
@@ -1344,7 +1344,7 @@
           <a:p>
             <a:fld id="{C650971E-85D7-4925-A186-D4F946D63362}" type="datetimeFigureOut">
               <a:rPr lang="pt-BR" smtClean="0"/>
-              <a:t>29/05/2025</a:t>
+              <a:t>30/05/2025</a:t>
             </a:fld>
             <a:endParaRPr lang="pt-BR"/>
           </a:p>
@@ -1619,7 +1619,7 @@
           <a:p>
             <a:fld id="{C650971E-85D7-4925-A186-D4F946D63362}" type="datetimeFigureOut">
               <a:rPr lang="pt-BR" smtClean="0"/>
-              <a:t>29/05/2025</a:t>
+              <a:t>30/05/2025</a:t>
             </a:fld>
             <a:endParaRPr lang="pt-BR"/>
           </a:p>
@@ -1884,7 +1884,7 @@
           <a:p>
             <a:fld id="{C650971E-85D7-4925-A186-D4F946D63362}" type="datetimeFigureOut">
               <a:rPr lang="pt-BR" smtClean="0"/>
-              <a:t>29/05/2025</a:t>
+              <a:t>30/05/2025</a:t>
             </a:fld>
             <a:endParaRPr lang="pt-BR"/>
           </a:p>
@@ -2296,7 +2296,7 @@
           <a:p>
             <a:fld id="{C650971E-85D7-4925-A186-D4F946D63362}" type="datetimeFigureOut">
               <a:rPr lang="pt-BR" smtClean="0"/>
-              <a:t>29/05/2025</a:t>
+              <a:t>30/05/2025</a:t>
             </a:fld>
             <a:endParaRPr lang="pt-BR"/>
           </a:p>
@@ -2437,7 +2437,7 @@
           <a:p>
             <a:fld id="{C650971E-85D7-4925-A186-D4F946D63362}" type="datetimeFigureOut">
               <a:rPr lang="pt-BR" smtClean="0"/>
-              <a:t>29/05/2025</a:t>
+              <a:t>30/05/2025</a:t>
             </a:fld>
             <a:endParaRPr lang="pt-BR"/>
           </a:p>
@@ -2550,7 +2550,7 @@
           <a:p>
             <a:fld id="{C650971E-85D7-4925-A186-D4F946D63362}" type="datetimeFigureOut">
               <a:rPr lang="pt-BR" smtClean="0"/>
-              <a:t>29/05/2025</a:t>
+              <a:t>30/05/2025</a:t>
             </a:fld>
             <a:endParaRPr lang="pt-BR"/>
           </a:p>
@@ -2861,7 +2861,7 @@
           <a:p>
             <a:fld id="{C650971E-85D7-4925-A186-D4F946D63362}" type="datetimeFigureOut">
               <a:rPr lang="pt-BR" smtClean="0"/>
-              <a:t>29/05/2025</a:t>
+              <a:t>30/05/2025</a:t>
             </a:fld>
             <a:endParaRPr lang="pt-BR"/>
           </a:p>
@@ -3149,7 +3149,7 @@
           <a:p>
             <a:fld id="{C650971E-85D7-4925-A186-D4F946D63362}" type="datetimeFigureOut">
               <a:rPr lang="pt-BR" smtClean="0"/>
-              <a:t>29/05/2025</a:t>
+              <a:t>30/05/2025</a:t>
             </a:fld>
             <a:endParaRPr lang="pt-BR"/>
           </a:p>
@@ -3390,7 +3390,7 @@
           <a:p>
             <a:fld id="{C650971E-85D7-4925-A186-D4F946D63362}" type="datetimeFigureOut">
               <a:rPr lang="pt-BR" smtClean="0"/>
-              <a:t>29/05/2025</a:t>
+              <a:t>30/05/2025</a:t>
             </a:fld>
             <a:endParaRPr lang="pt-BR"/>
           </a:p>
@@ -13112,7 +13112,7 @@
               <a:t> </a:t>
             </a:r>
             <a:r>
-              <a:rPr lang="pt-BR" b="1" dirty="0">
+              <a:rPr lang="pt-BR" dirty="0">
                 <a:solidFill>
                   <a:srgbClr val="B2275F"/>
                 </a:solidFill>

</xml_diff>

<commit_message>
Correção gramatical e da data da apresentação
</commit_message>
<xml_diff>
--- a/IHM Stefanini - Análise de Oportunidade - Flotação.pptx
+++ b/IHM Stefanini - Análise de Oportunidade - Flotação.pptx
@@ -242,7 +242,7 @@
           <a:p>
             <a:fld id="{CE0ED315-2846-4B4B-A190-EEBD2C7F90E5}" type="datetimeFigureOut">
               <a:rPr lang="pt-BR" smtClean="0"/>
-              <a:t>30/05/2025</a:t>
+              <a:t>02/06/2025</a:t>
             </a:fld>
             <a:endParaRPr lang="pt-BR"/>
           </a:p>
@@ -740,7 +740,7 @@
           <a:p>
             <a:fld id="{C650971E-85D7-4925-A186-D4F946D63362}" type="datetimeFigureOut">
               <a:rPr lang="pt-BR" smtClean="0"/>
-              <a:t>30/05/2025</a:t>
+              <a:t>02/06/2025</a:t>
             </a:fld>
             <a:endParaRPr lang="pt-BR"/>
           </a:p>
@@ -938,7 +938,7 @@
           <a:p>
             <a:fld id="{C650971E-85D7-4925-A186-D4F946D63362}" type="datetimeFigureOut">
               <a:rPr lang="pt-BR" smtClean="0"/>
-              <a:t>30/05/2025</a:t>
+              <a:t>02/06/2025</a:t>
             </a:fld>
             <a:endParaRPr lang="pt-BR"/>
           </a:p>
@@ -1146,7 +1146,7 @@
           <a:p>
             <a:fld id="{C650971E-85D7-4925-A186-D4F946D63362}" type="datetimeFigureOut">
               <a:rPr lang="pt-BR" smtClean="0"/>
-              <a:t>30/05/2025</a:t>
+              <a:t>02/06/2025</a:t>
             </a:fld>
             <a:endParaRPr lang="pt-BR"/>
           </a:p>
@@ -1344,7 +1344,7 @@
           <a:p>
             <a:fld id="{C650971E-85D7-4925-A186-D4F946D63362}" type="datetimeFigureOut">
               <a:rPr lang="pt-BR" smtClean="0"/>
-              <a:t>30/05/2025</a:t>
+              <a:t>02/06/2025</a:t>
             </a:fld>
             <a:endParaRPr lang="pt-BR"/>
           </a:p>
@@ -1619,7 +1619,7 @@
           <a:p>
             <a:fld id="{C650971E-85D7-4925-A186-D4F946D63362}" type="datetimeFigureOut">
               <a:rPr lang="pt-BR" smtClean="0"/>
-              <a:t>30/05/2025</a:t>
+              <a:t>02/06/2025</a:t>
             </a:fld>
             <a:endParaRPr lang="pt-BR"/>
           </a:p>
@@ -1884,7 +1884,7 @@
           <a:p>
             <a:fld id="{C650971E-85D7-4925-A186-D4F946D63362}" type="datetimeFigureOut">
               <a:rPr lang="pt-BR" smtClean="0"/>
-              <a:t>30/05/2025</a:t>
+              <a:t>02/06/2025</a:t>
             </a:fld>
             <a:endParaRPr lang="pt-BR"/>
           </a:p>
@@ -2296,7 +2296,7 @@
           <a:p>
             <a:fld id="{C650971E-85D7-4925-A186-D4F946D63362}" type="datetimeFigureOut">
               <a:rPr lang="pt-BR" smtClean="0"/>
-              <a:t>30/05/2025</a:t>
+              <a:t>02/06/2025</a:t>
             </a:fld>
             <a:endParaRPr lang="pt-BR"/>
           </a:p>
@@ -2437,7 +2437,7 @@
           <a:p>
             <a:fld id="{C650971E-85D7-4925-A186-D4F946D63362}" type="datetimeFigureOut">
               <a:rPr lang="pt-BR" smtClean="0"/>
-              <a:t>30/05/2025</a:t>
+              <a:t>02/06/2025</a:t>
             </a:fld>
             <a:endParaRPr lang="pt-BR"/>
           </a:p>
@@ -2550,7 +2550,7 @@
           <a:p>
             <a:fld id="{C650971E-85D7-4925-A186-D4F946D63362}" type="datetimeFigureOut">
               <a:rPr lang="pt-BR" smtClean="0"/>
-              <a:t>30/05/2025</a:t>
+              <a:t>02/06/2025</a:t>
             </a:fld>
             <a:endParaRPr lang="pt-BR"/>
           </a:p>
@@ -2861,7 +2861,7 @@
           <a:p>
             <a:fld id="{C650971E-85D7-4925-A186-D4F946D63362}" type="datetimeFigureOut">
               <a:rPr lang="pt-BR" smtClean="0"/>
-              <a:t>30/05/2025</a:t>
+              <a:t>02/06/2025</a:t>
             </a:fld>
             <a:endParaRPr lang="pt-BR"/>
           </a:p>
@@ -3149,7 +3149,7 @@
           <a:p>
             <a:fld id="{C650971E-85D7-4925-A186-D4F946D63362}" type="datetimeFigureOut">
               <a:rPr lang="pt-BR" smtClean="0"/>
-              <a:t>30/05/2025</a:t>
+              <a:t>02/06/2025</a:t>
             </a:fld>
             <a:endParaRPr lang="pt-BR"/>
           </a:p>
@@ -3390,7 +3390,7 @@
           <a:p>
             <a:fld id="{C650971E-85D7-4925-A186-D4F946D63362}" type="datetimeFigureOut">
               <a:rPr lang="pt-BR" smtClean="0"/>
-              <a:t>30/05/2025</a:t>
+              <a:t>02/06/2025</a:t>
             </a:fld>
             <a:endParaRPr lang="pt-BR"/>
           </a:p>
@@ -4036,7 +4036,25 @@
                   </a:solidFill>
                   <a:latin typeface="TT Fors Trial Thin" panose="020B0003030001020000" pitchFamily="34" charset="0"/>
                 </a:rPr>
-                <a:t>29 de maio de 2025</a:t>
+                <a:t>02 </a:t>
+              </a:r>
+              <a:r>
+                <a:rPr lang="pt-BR" sz="2000">
+                  <a:solidFill>
+                    <a:srgbClr val="B2275F"/>
+                  </a:solidFill>
+                  <a:latin typeface="TT Fors Trial Thin" panose="020B0003030001020000" pitchFamily="34" charset="0"/>
+                </a:rPr>
+                <a:t>de junho de </a:t>
+              </a:r>
+              <a:r>
+                <a:rPr lang="pt-BR" sz="2000" dirty="0">
+                  <a:solidFill>
+                    <a:srgbClr val="B2275F"/>
+                  </a:solidFill>
+                  <a:latin typeface="TT Fors Trial Thin" panose="020B0003030001020000" pitchFamily="34" charset="0"/>
+                </a:rPr>
+                <a:t>2025</a:t>
               </a:r>
             </a:p>
           </p:txBody>
@@ -6422,27 +6440,7 @@
                 <a:latin typeface="TT Fors Trial" panose="020B0003030001020000" pitchFamily="34" charset="0"/>
                 <a:sym typeface="Wingdings" panose="05000000000000000000" pitchFamily="2" charset="2"/>
               </a:rPr>
-              <a:t>Apesar de sua performance nos cenários </a:t>
-            </a:r>
-            <a:r>
-              <a:rPr lang="pt-BR" dirty="0" err="1">
-                <a:solidFill>
-                  <a:srgbClr val="0B1741"/>
-                </a:solidFill>
-                <a:latin typeface="TT Fors Trial" panose="020B0003030001020000" pitchFamily="34" charset="0"/>
-                <a:sym typeface="Wingdings" panose="05000000000000000000" pitchFamily="2" charset="2"/>
-              </a:rPr>
-              <a:t>inciais</a:t>
-            </a:r>
-            <a:r>
-              <a:rPr lang="pt-BR" dirty="0">
-                <a:solidFill>
-                  <a:srgbClr val="0B1741"/>
-                </a:solidFill>
-                <a:latin typeface="TT Fors Trial" panose="020B0003030001020000" pitchFamily="34" charset="0"/>
-                <a:sym typeface="Wingdings" panose="05000000000000000000" pitchFamily="2" charset="2"/>
-              </a:rPr>
-              <a:t>, pelos resultados encontrados e otimização de tempo, o modelo HGB não foi submetido a esse algoritmo.</a:t>
+              <a:t>Apesar de sua performance nos cenários iniciais, pelos resultados encontrados e otimização de tempo, o modelo HGB não foi submetido a esse algoritmo.</a:t>
             </a:r>
           </a:p>
         </p:txBody>
@@ -10125,6 +10123,9 @@
               <a:spcAft>
                 <a:spcPts val="600"/>
               </a:spcAft>
+              <a:buClr>
+                <a:srgbClr val="0B1741"/>
+              </a:buClr>
               <a:buFont typeface="Arial" panose="020B0604020202020204" pitchFamily="34" charset="0"/>
               <a:buChar char="•"/>
             </a:pPr>

</xml_diff>